<commit_message>
Update partnership pages and deck with current service lineup
- Add TokiQR (voice/face/text, free) as first card in "What we bring" section
- Replace old 4-tier pricing with self-service products (TokiQR free, UV Laminate ¥5,000, Quartz Glass ¥50,000) + Timeless Consulting (三世代/タイムレス変容)
- Add Grok/xAI to AI evaluation section (3社→4社), update AI quotes to match index.html
- Add Coach & Ambassador certification to ecosystem card
- Reorder footer links: TokiQR first, add Workaway/Off-Grid, SoulCarrier last
- Update generate-deck.py: pricing layout (3+2), traction layout (2x2 for 4 AI cards)
- Regenerate PPTX/PDF for both JA and EN
- Apply all changes to both JA and EN versions

Co-Authored-By: Claude Opus 4.6 <noreply@anthropic.com>
</commit_message>
<xml_diff>
--- a/tokistorage-partnership-deck-en.pptx
+++ b/tokistorage-partnership-deck-en.pptx
@@ -7170,7 +7170,7 @@
                 </a:solidFill>
                 <a:latin typeface="Calibri"/>
               </a:rPr>
-              <a:t>Q</a:t>
+              <a:t>T</a:t>
             </a:r>
           </a:p>
         </p:txBody>
@@ -7213,7 +7213,7 @@
                 </a:solidFill>
                 <a:latin typeface="Calibri"/>
               </a:rPr>
-              <a:t>Three-Layer Distributed Storage</a:t>
+              <a:t>TokiQR — Free, instant experience</a:t>
             </a:r>
           </a:p>
         </p:txBody>
@@ -7256,7 +7256,7 @@
                 </a:solidFill>
                 <a:latin typeface="Calibri"/>
               </a:rPr>
-              <a:t>Physical (quartz glass/laminate), National (National Diet Library legal deposit), Private (GitHub). Fully compliant with the 3-2-1 backup rule. Zero single points of failure.</a:t>
+              <a:t>Voice, face, and text in a QR code. Anyone can create one for free on their smartphone, with full three-layer distributed storage. Proprietary encoding (PCT patent in process).</a:t>
             </a:r>
           </a:p>
         </p:txBody>
@@ -7387,7 +7387,7 @@
                 </a:solidFill>
                 <a:latin typeface="Calibri"/>
               </a:rPr>
-              <a:t>U</a:t>
+              <a:t>Q</a:t>
             </a:r>
           </a:p>
         </p:txBody>
@@ -7430,7 +7430,7 @@
                 </a:solidFill>
                 <a:latin typeface="Calibri"/>
               </a:rPr>
-              <a:t>200+ use cases (organized by industry)</a:t>
+              <a:t>Three-Layer Distributed Storage</a:t>
             </a:r>
           </a:p>
         </p:txBody>
@@ -7473,7 +7473,7 @@
                 </a:solidFill>
                 <a:latin typeface="Calibri"/>
               </a:rPr>
-              <a:t>End-of-life, weddings, temples, schools, corporations, municipalities, NGOs, hotels, airlines. Ready for direct proposal integration.</a:t>
+              <a:t>Physical (quartz glass/laminate), National (National Diet Library legal deposit), Private (GitHub). 3-2-1 backup rule compliant. Zero single points of failure.</a:t>
             </a:r>
           </a:p>
         </p:txBody>
@@ -7604,7 +7604,7 @@
                 </a:solidFill>
                 <a:latin typeface="Calibri"/>
               </a:rPr>
-              <a:t>E</a:t>
+              <a:t>U</a:t>
             </a:r>
           </a:p>
         </p:txBody>
@@ -7647,7 +7647,7 @@
                 </a:solidFill>
                 <a:latin typeface="Calibri"/>
               </a:rPr>
-              <a:t>70+ philosophical essays (9 domains)</a:t>
+              <a:t>200+ use cases (organized by industry)</a:t>
             </a:r>
           </a:p>
         </p:txBody>
@@ -7690,7 +7690,7 @@
                 </a:solidFill>
                 <a:latin typeface="Calibri"/>
               </a:rPr>
-              <a:t>Proof of existence explored across psychology, religion, economics, AI, and space. Standalone intellectual content for client proposals.</a:t>
+              <a:t>End-of-life, weddings, temples, schools, corporations, municipalities, NGOs, hotels, airlines. Ready for direct proposal integration.</a:t>
             </a:r>
           </a:p>
         </p:txBody>
@@ -7864,7 +7864,7 @@
                 </a:solidFill>
                 <a:latin typeface="Calibri"/>
               </a:rPr>
-              <a:t>Pearl Soap + Ambassador network</a:t>
+              <a:t>Pearl Soap + Coach &amp; Ambassador network</a:t>
             </a:r>
           </a:p>
         </p:txBody>
@@ -7907,7 +7907,7 @@
                 </a:solidFill>
                 <a:latin typeface="Calibri"/>
               </a:rPr>
-              <a:t>A gift-economy practice and decentralized workshop network ready to scale nationwide. Direct end-user touchpoint.</a:t>
+              <a:t>A gift-economy practice with certified coaches and ambassadors running workshops nationwide. A decentralized movement.</a:t>
             </a:r>
           </a:p>
         </p:txBody>
@@ -10614,7 +10614,7 @@
                 </a:solidFill>
                 <a:latin typeface="Calibri"/>
               </a:rPr>
-              <a:t>Starting from ¥5,000 ($33) — an exceptionally low entry barrier for your proposals</a:t>
+              <a:t>TokiQR is free — zero entry barrier for your proposals</a:t>
             </a:r>
           </a:p>
         </p:txBody>
@@ -10664,14 +10664,57 @@
       </p:sp>
       <p:sp>
         <p:nvSpPr>
-          <p:cNvPr id="5" name="Rectangle 4"/>
+          <p:cNvPr id="5" name="TextBox 4"/>
+          <p:cNvSpPr txBox="1"/>
+          <p:nvPr/>
+        </p:nvSpPr>
+        <p:spPr>
+          <a:xfrm>
+            <a:off x="457200" y="1005840"/>
+            <a:ext cx="3657600" cy="228600"/>
+          </a:xfrm>
+          <a:prstGeom prst="rect">
+            <a:avLst/>
+          </a:prstGeom>
+          <a:noFill/>
+        </p:spPr>
+        <p:txBody>
+          <a:bodyPr wrap="square"/>
+          <a:lstStyle/>
+          <a:p>
+            <a:pPr algn="l">
+              <a:lnSpc>
+                <a:spcPct val="135000"/>
+              </a:lnSpc>
+              <a:spcBef>
+                <a:spcPts val="0"/>
+              </a:spcBef>
+              <a:spcAft>
+                <a:spcPts val="0"/>
+              </a:spcAft>
+            </a:pPr>
+            <a:r>
+              <a:rPr sz="1000" b="1">
+                <a:solidFill>
+                  <a:srgbClr val="475569"/>
+                </a:solidFill>
+                <a:latin typeface="Calibri"/>
+              </a:rPr>
+              <a:t>Self-Service Products</a:t>
+            </a:r>
+          </a:p>
+        </p:txBody>
+      </p:sp>
+      <p:sp>
+        <p:nvSpPr>
+          <p:cNvPr id="6" name="Rectangle 5"/>
           <p:cNvSpPr/>
           <p:nvPr/>
         </p:nvSpPr>
         <p:spPr>
           <a:xfrm>
-            <a:off x="457200" y="1051560"/>
-            <a:ext cx="3931920" cy="1783080"/>
+            <a:off x="457200" y="1280160"/>
+            <a:ext cx="2606040" cy="1325880"/>
           </a:xfrm>
           <a:prstGeom prst="rect">
             <a:avLst/>
@@ -10709,14 +10752,14 @@
       </p:sp>
       <p:sp>
         <p:nvSpPr>
-          <p:cNvPr id="6" name="TextBox 5"/>
-          <p:cNvSpPr txBox="1"/>
-          <p:nvPr/>
-        </p:nvSpPr>
-        <p:spPr>
-          <a:xfrm>
-            <a:off x="594360" y="1143000"/>
-            <a:ext cx="3657600" cy="274320"/>
+          <p:cNvPr id="7" name="TextBox 6"/>
+          <p:cNvSpPr txBox="1"/>
+          <p:nvPr/>
+        </p:nvSpPr>
+        <p:spPr>
+          <a:xfrm>
+            <a:off x="566928" y="1353312"/>
+            <a:ext cx="2386584" cy="228600"/>
           </a:xfrm>
           <a:prstGeom prst="rect">
             <a:avLst/>
@@ -10739,27 +10782,27 @@
               </a:spcAft>
             </a:pPr>
             <a:r>
-              <a:rPr sz="1200" b="1">
+              <a:rPr sz="1100" b="1">
                 <a:solidFill>
                   <a:srgbClr val="1E293B"/>
                 </a:solidFill>
                 <a:latin typeface="Calibri"/>
               </a:rPr>
-              <a:t>Trial Plan</a:t>
-            </a:r>
-          </a:p>
-        </p:txBody>
-      </p:sp>
-      <p:sp>
-        <p:nvSpPr>
-          <p:cNvPr id="7" name="TextBox 6"/>
-          <p:cNvSpPr txBox="1"/>
-          <p:nvPr/>
-        </p:nvSpPr>
-        <p:spPr>
-          <a:xfrm>
-            <a:off x="594360" y="1435608"/>
-            <a:ext cx="3657600" cy="320040"/>
+              <a:t>TokiQR</a:t>
+            </a:r>
+          </a:p>
+        </p:txBody>
+      </p:sp>
+      <p:sp>
+        <p:nvSpPr>
+          <p:cNvPr id="8" name="TextBox 7"/>
+          <p:cNvSpPr txBox="1"/>
+          <p:nvPr/>
+        </p:nvSpPr>
+        <p:spPr>
+          <a:xfrm>
+            <a:off x="566928" y="1581912"/>
+            <a:ext cx="2386584" cy="274320"/>
           </a:xfrm>
           <a:prstGeom prst="rect">
             <a:avLst/>
@@ -10782,27 +10825,27 @@
               </a:spcAft>
             </a:pPr>
             <a:r>
-              <a:rPr sz="1400" b="1">
+              <a:rPr sz="1300" b="1">
                 <a:solidFill>
                   <a:srgbClr val="2563EB"/>
                 </a:solidFill>
                 <a:latin typeface="Calibri"/>
               </a:rPr>
-              <a:t>¥5,000 ($33)</a:t>
-            </a:r>
-          </a:p>
-        </p:txBody>
-      </p:sp>
-      <p:sp>
-        <p:nvSpPr>
-          <p:cNvPr id="8" name="TextBox 7"/>
-          <p:cNvSpPr txBox="1"/>
-          <p:nvPr/>
-        </p:nvSpPr>
-        <p:spPr>
-          <a:xfrm>
-            <a:off x="594360" y="1828800"/>
-            <a:ext cx="3657600" cy="914400"/>
+              <a:t>Free</a:t>
+            </a:r>
+          </a:p>
+        </p:txBody>
+      </p:sp>
+      <p:sp>
+        <p:nvSpPr>
+          <p:cNvPr id="9" name="TextBox 8"/>
+          <p:cNvSpPr txBox="1"/>
+          <p:nvPr/>
+        </p:nvSpPr>
+        <p:spPr>
+          <a:xfrm>
+            <a:off x="566928" y="1901952"/>
+            <a:ext cx="2386584" cy="612648"/>
           </a:xfrm>
           <a:prstGeom prst="rect">
             <a:avLst/>
@@ -10825,27 +10868,27 @@
               </a:spcAft>
             </a:pPr>
             <a:r>
-              <a:rPr sz="1000" b="0">
+              <a:rPr sz="900" b="0">
                 <a:solidFill>
                   <a:srgbClr val="475569"/>
                 </a:solidFill>
                 <a:latin typeface="Calibri"/>
               </a:rPr>
-              <a:t>Experience three-layer storage with A4 laminate. TokiQR → laminate + NDL deposit + GitHub.</a:t>
-            </a:r>
-          </a:p>
-        </p:txBody>
-      </p:sp>
-      <p:sp>
-        <p:nvSpPr>
-          <p:cNvPr id="9" name="Rectangle 8"/>
+              <a:t>Voice, face, and text in a QR code. Create on any smartphone; NDL + GitHub three-layer storage.</a:t>
+            </a:r>
+          </a:p>
+        </p:txBody>
+      </p:sp>
+      <p:sp>
+        <p:nvSpPr>
+          <p:cNvPr id="10" name="Rectangle 9"/>
           <p:cNvSpPr/>
           <p:nvPr/>
         </p:nvSpPr>
         <p:spPr>
           <a:xfrm>
-            <a:off x="4617720" y="1051560"/>
-            <a:ext cx="3931920" cy="1783080"/>
+            <a:off x="3273552" y="1280160"/>
+            <a:ext cx="2606040" cy="1325880"/>
           </a:xfrm>
           <a:prstGeom prst="rect">
             <a:avLst/>
@@ -10883,14 +10926,14 @@
       </p:sp>
       <p:sp>
         <p:nvSpPr>
-          <p:cNvPr id="10" name="TextBox 9"/>
-          <p:cNvSpPr txBox="1"/>
-          <p:nvPr/>
-        </p:nvSpPr>
-        <p:spPr>
-          <a:xfrm>
-            <a:off x="4754880" y="1143000"/>
-            <a:ext cx="3657600" cy="274320"/>
+          <p:cNvPr id="11" name="TextBox 10"/>
+          <p:cNvSpPr txBox="1"/>
+          <p:nvPr/>
+        </p:nvSpPr>
+        <p:spPr>
+          <a:xfrm>
+            <a:off x="3383280" y="1353312"/>
+            <a:ext cx="2386584" cy="228600"/>
           </a:xfrm>
           <a:prstGeom prst="rect">
             <a:avLst/>
@@ -10913,27 +10956,27 @@
               </a:spcAft>
             </a:pPr>
             <a:r>
-              <a:rPr sz="1200" b="1">
+              <a:rPr sz="1100" b="1">
                 <a:solidFill>
                   <a:srgbClr val="1E293B"/>
                 </a:solidFill>
                 <a:latin typeface="Calibri"/>
               </a:rPr>
-              <a:t>Individual Plan</a:t>
-            </a:r>
-          </a:p>
-        </p:txBody>
-      </p:sp>
-      <p:sp>
-        <p:nvSpPr>
-          <p:cNvPr id="11" name="TextBox 10"/>
-          <p:cNvSpPr txBox="1"/>
-          <p:nvPr/>
-        </p:nvSpPr>
-        <p:spPr>
-          <a:xfrm>
-            <a:off x="4754880" y="1435608"/>
-            <a:ext cx="3657600" cy="320040"/>
+              <a:t>UV Laminate QR</a:t>
+            </a:r>
+          </a:p>
+        </p:txBody>
+      </p:sp>
+      <p:sp>
+        <p:nvSpPr>
+          <p:cNvPr id="12" name="TextBox 11"/>
+          <p:cNvSpPr txBox="1"/>
+          <p:nvPr/>
+        </p:nvSpPr>
+        <p:spPr>
+          <a:xfrm>
+            <a:off x="3383280" y="1581912"/>
+            <a:ext cx="2386584" cy="274320"/>
           </a:xfrm>
           <a:prstGeom prst="rect">
             <a:avLst/>
@@ -10956,27 +10999,27 @@
               </a:spcAft>
             </a:pPr>
             <a:r>
-              <a:rPr sz="1400" b="1">
+              <a:rPr sz="1300" b="1">
                 <a:solidFill>
                   <a:srgbClr val="2563EB"/>
                 </a:solidFill>
                 <a:latin typeface="Calibri"/>
               </a:rPr>
-              <a:t>¥50,000 ($330)</a:t>
-            </a:r>
-          </a:p>
-        </p:txBody>
-      </p:sp>
-      <p:sp>
-        <p:nvSpPr>
-          <p:cNvPr id="12" name="TextBox 11"/>
-          <p:cNvSpPr txBox="1"/>
-          <p:nvPr/>
-        </p:nvSpPr>
-        <p:spPr>
-          <a:xfrm>
-            <a:off x="4754880" y="1828800"/>
-            <a:ext cx="3657600" cy="914400"/>
+              <a:t>¥5,000 ($33)</a:t>
+            </a:r>
+          </a:p>
+        </p:txBody>
+      </p:sp>
+      <p:sp>
+        <p:nvSpPr>
+          <p:cNvPr id="13" name="TextBox 12"/>
+          <p:cNvSpPr txBox="1"/>
+          <p:nvPr/>
+        </p:nvSpPr>
+        <p:spPr>
+          <a:xfrm>
+            <a:off x="3383280" y="1901952"/>
+            <a:ext cx="2386584" cy="612648"/>
           </a:xfrm>
           <a:prstGeom prst="rect">
             <a:avLst/>
@@ -10999,27 +11042,27 @@
               </a:spcAft>
             </a:pPr>
             <a:r>
-              <a:rPr sz="1000" b="0">
+              <a:rPr sz="900" b="0">
                 <a:solidFill>
                   <a:srgbClr val="475569"/>
                 </a:solidFill>
                 <a:latin typeface="Calibri"/>
               </a:rPr>
-              <a:t>Inscribed on quartz glass. ¥50 per year. 1,000-year durability (theoretical).</a:t>
-            </a:r>
-          </a:p>
-        </p:txBody>
-      </p:sp>
-      <p:sp>
-        <p:nvSpPr>
-          <p:cNvPr id="13" name="Rectangle 12"/>
+              <a:t>Voice QR on A4 laminate. Weather-resistant, long-term preservation.</a:t>
+            </a:r>
+          </a:p>
+        </p:txBody>
+      </p:sp>
+      <p:sp>
+        <p:nvSpPr>
+          <p:cNvPr id="14" name="Rectangle 13"/>
           <p:cNvSpPr/>
           <p:nvPr/>
         </p:nvSpPr>
         <p:spPr>
           <a:xfrm>
-            <a:off x="457200" y="2971800"/>
-            <a:ext cx="3931920" cy="1783080"/>
+            <a:off x="6089904" y="1280160"/>
+            <a:ext cx="2606040" cy="1325880"/>
           </a:xfrm>
           <a:prstGeom prst="rect">
             <a:avLst/>
@@ -11057,14 +11100,14 @@
       </p:sp>
       <p:sp>
         <p:nvSpPr>
-          <p:cNvPr id="14" name="TextBox 13"/>
-          <p:cNvSpPr txBox="1"/>
-          <p:nvPr/>
-        </p:nvSpPr>
-        <p:spPr>
-          <a:xfrm>
-            <a:off x="594360" y="3063240"/>
-            <a:ext cx="3657600" cy="274320"/>
+          <p:cNvPr id="15" name="TextBox 14"/>
+          <p:cNvSpPr txBox="1"/>
+          <p:nvPr/>
+        </p:nvSpPr>
+        <p:spPr>
+          <a:xfrm>
+            <a:off x="6199632" y="1353312"/>
+            <a:ext cx="2386584" cy="228600"/>
           </a:xfrm>
           <a:prstGeom prst="rect">
             <a:avLst/>
@@ -11087,12 +11130,229 @@
               </a:spcAft>
             </a:pPr>
             <a:r>
-              <a:rPr sz="1200" b="1">
+              <a:rPr sz="1100" b="1">
                 <a:solidFill>
                   <a:srgbClr val="1E293B"/>
                 </a:solidFill>
                 <a:latin typeface="Calibri"/>
               </a:rPr>
+              <a:t>Quartz Glass QR</a:t>
+            </a:r>
+          </a:p>
+        </p:txBody>
+      </p:sp>
+      <p:sp>
+        <p:nvSpPr>
+          <p:cNvPr id="16" name="TextBox 15"/>
+          <p:cNvSpPr txBox="1"/>
+          <p:nvPr/>
+        </p:nvSpPr>
+        <p:spPr>
+          <a:xfrm>
+            <a:off x="6199632" y="1581912"/>
+            <a:ext cx="2386584" cy="274320"/>
+          </a:xfrm>
+          <a:prstGeom prst="rect">
+            <a:avLst/>
+          </a:prstGeom>
+          <a:noFill/>
+        </p:spPr>
+        <p:txBody>
+          <a:bodyPr wrap="square"/>
+          <a:lstStyle/>
+          <a:p>
+            <a:pPr algn="l">
+              <a:lnSpc>
+                <a:spcPct val="135000"/>
+              </a:lnSpc>
+              <a:spcBef>
+                <a:spcPts val="0"/>
+              </a:spcBef>
+              <a:spcAft>
+                <a:spcPts val="0"/>
+              </a:spcAft>
+            </a:pPr>
+            <a:r>
+              <a:rPr sz="1300" b="1">
+                <a:solidFill>
+                  <a:srgbClr val="2563EB"/>
+                </a:solidFill>
+                <a:latin typeface="Calibri"/>
+              </a:rPr>
+              <a:t>¥50,000 ($330)</a:t>
+            </a:r>
+          </a:p>
+        </p:txBody>
+      </p:sp>
+      <p:sp>
+        <p:nvSpPr>
+          <p:cNvPr id="17" name="TextBox 16"/>
+          <p:cNvSpPr txBox="1"/>
+          <p:nvPr/>
+        </p:nvSpPr>
+        <p:spPr>
+          <a:xfrm>
+            <a:off x="6199632" y="1901952"/>
+            <a:ext cx="2386584" cy="612648"/>
+          </a:xfrm>
+          <a:prstGeom prst="rect">
+            <a:avLst/>
+          </a:prstGeom>
+          <a:noFill/>
+        </p:spPr>
+        <p:txBody>
+          <a:bodyPr wrap="square"/>
+          <a:lstStyle/>
+          <a:p>
+            <a:pPr algn="l">
+              <a:lnSpc>
+                <a:spcPct val="135000"/>
+              </a:lnSpc>
+              <a:spcBef>
+                <a:spcPts val="0"/>
+              </a:spcBef>
+              <a:spcAft>
+                <a:spcPts val="0"/>
+              </a:spcAft>
+            </a:pPr>
+            <a:r>
+              <a:rPr sz="900" b="0">
+                <a:solidFill>
+                  <a:srgbClr val="475569"/>
+                </a:solidFill>
+                <a:latin typeface="Calibri"/>
+              </a:rPr>
+              <a:t>Inscribed on quartz glass. ¥50/year. 1,000-year durability (theoretical).</a:t>
+            </a:r>
+          </a:p>
+        </p:txBody>
+      </p:sp>
+      <p:sp>
+        <p:nvSpPr>
+          <p:cNvPr id="18" name="TextBox 17"/>
+          <p:cNvSpPr txBox="1"/>
+          <p:nvPr/>
+        </p:nvSpPr>
+        <p:spPr>
+          <a:xfrm>
+            <a:off x="457200" y="2788920"/>
+            <a:ext cx="3657600" cy="228600"/>
+          </a:xfrm>
+          <a:prstGeom prst="rect">
+            <a:avLst/>
+          </a:prstGeom>
+          <a:noFill/>
+        </p:spPr>
+        <p:txBody>
+          <a:bodyPr wrap="square"/>
+          <a:lstStyle/>
+          <a:p>
+            <a:pPr algn="l">
+              <a:lnSpc>
+                <a:spcPct val="135000"/>
+              </a:lnSpc>
+              <a:spcBef>
+                <a:spcPts val="0"/>
+              </a:spcBef>
+              <a:spcAft>
+                <a:spcPts val="0"/>
+              </a:spcAft>
+            </a:pPr>
+            <a:r>
+              <a:rPr sz="1000" b="1">
+                <a:solidFill>
+                  <a:srgbClr val="475569"/>
+                </a:solidFill>
+                <a:latin typeface="Calibri"/>
+              </a:rPr>
+              <a:t>Timeless Consulting</a:t>
+            </a:r>
+          </a:p>
+        </p:txBody>
+      </p:sp>
+      <p:sp>
+        <p:nvSpPr>
+          <p:cNvPr id="19" name="Rectangle 18"/>
+          <p:cNvSpPr/>
+          <p:nvPr/>
+        </p:nvSpPr>
+        <p:spPr>
+          <a:xfrm>
+            <a:off x="457200" y="3108960"/>
+            <a:ext cx="3931920" cy="1097280"/>
+          </a:xfrm>
+          <a:prstGeom prst="rect">
+            <a:avLst/>
+          </a:prstGeom>
+          <a:solidFill>
+            <a:srgbClr val="FFFFFF"/>
+          </a:solidFill>
+          <a:ln w="9525">
+            <a:solidFill>
+              <a:srgbClr val="C9A962"/>
+            </a:solidFill>
+          </a:ln>
+        </p:spPr>
+        <p:style>
+          <a:lnRef idx="1">
+            <a:schemeClr val="accent1"/>
+          </a:lnRef>
+          <a:fillRef idx="3">
+            <a:schemeClr val="accent1"/>
+          </a:fillRef>
+          <a:effectRef idx="2">
+            <a:schemeClr val="accent1"/>
+          </a:effectRef>
+          <a:fontRef idx="minor">
+            <a:schemeClr val="lt1"/>
+          </a:fontRef>
+        </p:style>
+        <p:txBody>
+          <a:bodyPr rtlCol="0" anchor="ctr"/>
+          <a:lstStyle/>
+          <a:p>
+            <a:pPr algn="ctr"/>
+          </a:p>
+        </p:txBody>
+      </p:sp>
+      <p:sp>
+        <p:nvSpPr>
+          <p:cNvPr id="20" name="TextBox 19"/>
+          <p:cNvSpPr txBox="1"/>
+          <p:nvPr/>
+        </p:nvSpPr>
+        <p:spPr>
+          <a:xfrm>
+            <a:off x="566928" y="3182112"/>
+            <a:ext cx="3712464" cy="228600"/>
+          </a:xfrm>
+          <a:prstGeom prst="rect">
+            <a:avLst/>
+          </a:prstGeom>
+          <a:noFill/>
+        </p:spPr>
+        <p:txBody>
+          <a:bodyPr wrap="square"/>
+          <a:lstStyle/>
+          <a:p>
+            <a:pPr algn="l">
+              <a:lnSpc>
+                <a:spcPct val="135000"/>
+              </a:lnSpc>
+              <a:spcBef>
+                <a:spcPts val="0"/>
+              </a:spcBef>
+              <a:spcAft>
+                <a:spcPts val="0"/>
+              </a:spcAft>
+            </a:pPr>
+            <a:r>
+              <a:rPr sz="1100" b="1">
+                <a:solidFill>
+                  <a:srgbClr val="1E293B"/>
+                </a:solidFill>
+                <a:latin typeface="Calibri"/>
+              </a:rPr>
               <a:t>Three-Generation</a:t>
             </a:r>
           </a:p>
@@ -11100,14 +11360,14 @@
       </p:sp>
       <p:sp>
         <p:nvSpPr>
-          <p:cNvPr id="15" name="TextBox 14"/>
-          <p:cNvSpPr txBox="1"/>
-          <p:nvPr/>
-        </p:nvSpPr>
-        <p:spPr>
-          <a:xfrm>
-            <a:off x="594360" y="3355848"/>
-            <a:ext cx="3657600" cy="320040"/>
+          <p:cNvPr id="21" name="TextBox 20"/>
+          <p:cNvSpPr txBox="1"/>
+          <p:nvPr/>
+        </p:nvSpPr>
+        <p:spPr>
+          <a:xfrm>
+            <a:off x="566928" y="3410712"/>
+            <a:ext cx="3712464" cy="274320"/>
           </a:xfrm>
           <a:prstGeom prst="rect">
             <a:avLst/>
@@ -11130,9 +11390,9 @@
               </a:spcAft>
             </a:pPr>
             <a:r>
-              <a:rPr sz="1400" b="1">
-                <a:solidFill>
-                  <a:srgbClr val="2563EB"/>
+              <a:rPr sz="1300" b="1">
+                <a:solidFill>
+                  <a:srgbClr val="C9A962"/>
                 </a:solidFill>
                 <a:latin typeface="Calibri"/>
               </a:rPr>
@@ -11143,14 +11403,14 @@
       </p:sp>
       <p:sp>
         <p:nvSpPr>
-          <p:cNvPr id="16" name="TextBox 15"/>
-          <p:cNvSpPr txBox="1"/>
-          <p:nvPr/>
-        </p:nvSpPr>
-        <p:spPr>
-          <a:xfrm>
-            <a:off x="594360" y="3749040"/>
-            <a:ext cx="3657600" cy="914400"/>
+          <p:cNvPr id="22" name="TextBox 21"/>
+          <p:cNvSpPr txBox="1"/>
+          <p:nvPr/>
+        </p:nvSpPr>
+        <p:spPr>
+          <a:xfrm>
+            <a:off x="566928" y="3703320"/>
+            <a:ext cx="3712464" cy="411480"/>
           </a:xfrm>
           <a:prstGeom prst="rect">
             <a:avLst/>
@@ -11173,7 +11433,7 @@
               </a:spcAft>
             </a:pPr>
             <a:r>
-              <a:rPr sz="1000" b="0">
+              <a:rPr sz="900" b="0">
                 <a:solidFill>
                   <a:srgbClr val="475569"/>
                 </a:solidFill>
@@ -11186,14 +11446,14 @@
       </p:sp>
       <p:sp>
         <p:nvSpPr>
-          <p:cNvPr id="17" name="Rectangle 16"/>
+          <p:cNvPr id="23" name="Rectangle 22"/>
           <p:cNvSpPr/>
           <p:nvPr/>
         </p:nvSpPr>
         <p:spPr>
           <a:xfrm>
-            <a:off x="4617720" y="2971800"/>
-            <a:ext cx="3931920" cy="1783080"/>
+            <a:off x="4617720" y="3108960"/>
+            <a:ext cx="3931920" cy="1097280"/>
           </a:xfrm>
           <a:prstGeom prst="rect">
             <a:avLst/>
@@ -11231,14 +11491,14 @@
       </p:sp>
       <p:sp>
         <p:nvSpPr>
-          <p:cNvPr id="18" name="TextBox 17"/>
-          <p:cNvSpPr txBox="1"/>
-          <p:nvPr/>
-        </p:nvSpPr>
-        <p:spPr>
-          <a:xfrm>
-            <a:off x="4754880" y="3063240"/>
-            <a:ext cx="3657600" cy="274320"/>
+          <p:cNvPr id="24" name="TextBox 23"/>
+          <p:cNvSpPr txBox="1"/>
+          <p:nvPr/>
+        </p:nvSpPr>
+        <p:spPr>
+          <a:xfrm>
+            <a:off x="4727448" y="3182112"/>
+            <a:ext cx="3712464" cy="228600"/>
           </a:xfrm>
           <a:prstGeom prst="rect">
             <a:avLst/>
@@ -11261,27 +11521,27 @@
               </a:spcAft>
             </a:pPr>
             <a:r>
-              <a:rPr sz="1200" b="1">
+              <a:rPr sz="1100" b="1">
                 <a:solidFill>
                   <a:srgbClr val="1E293B"/>
                 </a:solidFill>
                 <a:latin typeface="Calibri"/>
               </a:rPr>
-              <a:t>Voice Memorial</a:t>
-            </a:r>
-          </a:p>
-        </p:txBody>
-      </p:sp>
-      <p:sp>
-        <p:nvSpPr>
-          <p:cNvPr id="19" name="TextBox 18"/>
-          <p:cNvSpPr txBox="1"/>
-          <p:nvPr/>
-        </p:nvSpPr>
-        <p:spPr>
-          <a:xfrm>
-            <a:off x="4754880" y="3355848"/>
-            <a:ext cx="3657600" cy="320040"/>
+              <a:t>Timeless Transformation</a:t>
+            </a:r>
+          </a:p>
+        </p:txBody>
+      </p:sp>
+      <p:sp>
+        <p:nvSpPr>
+          <p:cNvPr id="25" name="TextBox 24"/>
+          <p:cNvSpPr txBox="1"/>
+          <p:nvPr/>
+        </p:nvSpPr>
+        <p:spPr>
+          <a:xfrm>
+            <a:off x="4727448" y="3410712"/>
+            <a:ext cx="3712464" cy="274320"/>
           </a:xfrm>
           <a:prstGeom prst="rect">
             <a:avLst/>
@@ -11304,9 +11564,9 @@
               </a:spcAft>
             </a:pPr>
             <a:r>
-              <a:rPr sz="1400" b="1">
-                <a:solidFill>
-                  <a:srgbClr val="2563EB"/>
+              <a:rPr sz="1300" b="1">
+                <a:solidFill>
+                  <a:srgbClr val="C9A962"/>
                 </a:solidFill>
                 <a:latin typeface="Calibri"/>
               </a:rPr>
@@ -11317,14 +11577,14 @@
       </p:sp>
       <p:sp>
         <p:nvSpPr>
-          <p:cNvPr id="20" name="TextBox 19"/>
-          <p:cNvSpPr txBox="1"/>
-          <p:nvPr/>
-        </p:nvSpPr>
-        <p:spPr>
-          <a:xfrm>
-            <a:off x="4754880" y="3749040"/>
-            <a:ext cx="3657600" cy="914400"/>
+          <p:cNvPr id="26" name="TextBox 25"/>
+          <p:cNvSpPr txBox="1"/>
+          <p:nvPr/>
+        </p:nvSpPr>
+        <p:spPr>
+          <a:xfrm>
+            <a:off x="4727448" y="3703320"/>
+            <a:ext cx="3712464" cy="411480"/>
           </a:xfrm>
           <a:prstGeom prst="rect">
             <a:avLst/>
@@ -11347,7 +11607,7 @@
               </a:spcAft>
             </a:pPr>
             <a:r>
-              <a:rPr sz="1000" b="0">
+              <a:rPr sz="900" b="0">
                 <a:solidFill>
                   <a:srgbClr val="475569"/>
                 </a:solidFill>
@@ -11360,7 +11620,7 @@
       </p:sp>
       <p:sp>
         <p:nvSpPr>
-          <p:cNvPr id="21" name="Rectangle 20"/>
+          <p:cNvPr id="27" name="Rectangle 26"/>
           <p:cNvSpPr/>
           <p:nvPr/>
         </p:nvSpPr>
@@ -11403,7 +11663,7 @@
       </p:sp>
       <p:sp>
         <p:nvSpPr>
-          <p:cNvPr id="22" name="TextBox 21"/>
+          <p:cNvPr id="28" name="TextBox 27"/>
           <p:cNvSpPr txBox="1"/>
           <p:nvPr/>
         </p:nvSpPr>
@@ -11446,7 +11706,7 @@
       </p:sp>
       <p:sp>
         <p:nvSpPr>
-          <p:cNvPr id="23" name="TextBox 22"/>
+          <p:cNvPr id="29" name="TextBox 28"/>
           <p:cNvSpPr txBox="1"/>
           <p:nvPr/>
         </p:nvSpPr>
@@ -11489,7 +11749,7 @@
       </p:sp>
       <p:sp>
         <p:nvSpPr>
-          <p:cNvPr id="24" name="TextBox 23"/>
+          <p:cNvPr id="30" name="TextBox 29"/>
           <p:cNvSpPr txBox="1"/>
           <p:nvPr/>
         </p:nvSpPr>
@@ -12728,7 +12988,7 @@
                 </a:solidFill>
                 <a:latin typeface="Calibri"/>
               </a:rPr>
-              <a:t>Three major AI platforms and cultural institutions have independently validated us</a:t>
+              <a:t>Four major AI platforms and cultural institutions have independently validated us</a:t>
             </a:r>
           </a:p>
         </p:txBody>
@@ -12785,7 +13045,7 @@
         <p:spPr>
           <a:xfrm>
             <a:off x="457200" y="1051560"/>
-            <a:ext cx="2606040" cy="2011680"/>
+            <a:ext cx="3931920" cy="1234440"/>
           </a:xfrm>
           <a:prstGeom prst="rect">
             <a:avLst/>
@@ -12829,8 +13089,8 @@
         </p:nvSpPr>
         <p:spPr>
           <a:xfrm>
-            <a:off x="594360" y="1143000"/>
-            <a:ext cx="2331720" cy="228600"/>
+            <a:off x="594360" y="1124712"/>
+            <a:ext cx="3657600" cy="201168"/>
           </a:xfrm>
           <a:prstGeom prst="rect">
             <a:avLst/>
@@ -12872,8 +13132,8 @@
         </p:nvSpPr>
         <p:spPr>
           <a:xfrm>
-            <a:off x="594360" y="1417320"/>
-            <a:ext cx="2331720" cy="274320"/>
+            <a:off x="594360" y="1344168"/>
+            <a:ext cx="3657600" cy="228600"/>
           </a:xfrm>
           <a:prstGeom prst="rect">
             <a:avLst/>
@@ -12915,8 +13175,8 @@
         </p:nvSpPr>
         <p:spPr>
           <a:xfrm>
-            <a:off x="594360" y="1737360"/>
-            <a:ext cx="2331720" cy="1234440"/>
+            <a:off x="594360" y="1600200"/>
+            <a:ext cx="3657600" cy="594360"/>
           </a:xfrm>
           <a:prstGeom prst="rect">
             <a:avLst/>
@@ -12958,8 +13218,8 @@
         </p:nvSpPr>
         <p:spPr>
           <a:xfrm>
-            <a:off x="3273552" y="1051560"/>
-            <a:ext cx="2606040" cy="2011680"/>
+            <a:off x="4617720" y="1051560"/>
+            <a:ext cx="3931920" cy="1234440"/>
           </a:xfrm>
           <a:prstGeom prst="rect">
             <a:avLst/>
@@ -13003,8 +13263,8 @@
         </p:nvSpPr>
         <p:spPr>
           <a:xfrm>
-            <a:off x="3410712" y="1143000"/>
-            <a:ext cx="2331720" cy="228600"/>
+            <a:off x="4754880" y="1124712"/>
+            <a:ext cx="3657600" cy="201168"/>
           </a:xfrm>
           <a:prstGeom prst="rect">
             <a:avLst/>
@@ -13046,8 +13306,8 @@
         </p:nvSpPr>
         <p:spPr>
           <a:xfrm>
-            <a:off x="3410712" y="1417320"/>
-            <a:ext cx="2331720" cy="274320"/>
+            <a:off x="4754880" y="1344168"/>
+            <a:ext cx="3657600" cy="228600"/>
           </a:xfrm>
           <a:prstGeom prst="rect">
             <a:avLst/>
@@ -13076,7 +13336,7 @@
                 </a:solidFill>
                 <a:latin typeface="Calibri"/>
               </a:rPr>
-              <a:t>Institutional Design</a:t>
+              <a:t>The only option</a:t>
             </a:r>
           </a:p>
         </p:txBody>
@@ -13089,8 +13349,8 @@
         </p:nvSpPr>
         <p:spPr>
           <a:xfrm>
-            <a:off x="3410712" y="1737360"/>
-            <a:ext cx="2331720" cy="1234440"/>
+            <a:off x="4754880" y="1600200"/>
+            <a:ext cx="3657600" cy="594360"/>
           </a:xfrm>
           <a:prstGeom prst="rect">
             <a:avLst/>
@@ -13119,7 +13379,7 @@
                 </a:solidFill>
                 <a:latin typeface="Calibri"/>
               </a:rPr>
-              <a:t>"A sophisticated design that leverages the architecture of legal systems"</a:t>
+              <a:t>"Built 'eternity' not as a fantasy, but with a realistic budget and solid logic"</a:t>
             </a:r>
           </a:p>
         </p:txBody>
@@ -13132,8 +13392,8 @@
         </p:nvSpPr>
         <p:spPr>
           <a:xfrm>
-            <a:off x="6089904" y="1051560"/>
-            <a:ext cx="2606040" cy="2011680"/>
+            <a:off x="457200" y="2395728"/>
+            <a:ext cx="3931920" cy="1234440"/>
           </a:xfrm>
           <a:prstGeom prst="rect">
             <a:avLst/>
@@ -13177,8 +13437,8 @@
         </p:nvSpPr>
         <p:spPr>
           <a:xfrm>
-            <a:off x="6227064" y="1143000"/>
-            <a:ext cx="2331720" cy="228600"/>
+            <a:off x="594360" y="2468880"/>
+            <a:ext cx="3657600" cy="201168"/>
           </a:xfrm>
           <a:prstGeom prst="rect">
             <a:avLst/>
@@ -13220,8 +13480,8 @@
         </p:nvSpPr>
         <p:spPr>
           <a:xfrm>
-            <a:off x="6227064" y="1417320"/>
-            <a:ext cx="2331720" cy="274320"/>
+            <a:off x="594360" y="2688336"/>
+            <a:ext cx="3657600" cy="228600"/>
           </a:xfrm>
           <a:prstGeom prst="rect">
             <a:avLst/>
@@ -13250,7 +13510,7 @@
                 </a:solidFill>
                 <a:latin typeface="Calibri"/>
               </a:rPr>
-              <a:t>Cost Performance</a:t>
+              <a:t>New standard</a:t>
             </a:r>
           </a:p>
         </p:txBody>
@@ -13263,8 +13523,8 @@
         </p:nvSpPr>
         <p:spPr>
           <a:xfrm>
-            <a:off x="6227064" y="1737360"/>
-            <a:ext cx="2331720" cy="1234440"/>
+            <a:off x="594360" y="2944368"/>
+            <a:ext cx="3657600" cy="594360"/>
           </a:xfrm>
           <a:prstGeom prst="rect">
             <a:avLst/>
@@ -13293,7 +13553,7 @@
                 </a:solidFill>
                 <a:latin typeface="Calibri"/>
               </a:rPr>
-              <a:t>"An annual cost of ¥50 is extraordinary value"</a:t>
+              <a:t>"Technical foundation, social significance, and cost performance all merit the highest evaluation"</a:t>
             </a:r>
           </a:p>
         </p:txBody>
@@ -13306,8 +13566,182 @@
         </p:nvSpPr>
         <p:spPr>
           <a:xfrm>
-            <a:off x="457200" y="3246120"/>
-            <a:ext cx="7863840" cy="640080"/>
+            <a:off x="4617720" y="2395728"/>
+            <a:ext cx="3931920" cy="1234440"/>
+          </a:xfrm>
+          <a:prstGeom prst="rect">
+            <a:avLst/>
+          </a:prstGeom>
+          <a:solidFill>
+            <a:srgbClr val="FFFFFF"/>
+          </a:solidFill>
+          <a:ln w="9525">
+            <a:solidFill>
+              <a:srgbClr val="E2E8F0"/>
+            </a:solidFill>
+          </a:ln>
+        </p:spPr>
+        <p:style>
+          <a:lnRef idx="1">
+            <a:schemeClr val="accent1"/>
+          </a:lnRef>
+          <a:fillRef idx="3">
+            <a:schemeClr val="accent1"/>
+          </a:fillRef>
+          <a:effectRef idx="2">
+            <a:schemeClr val="accent1"/>
+          </a:effectRef>
+          <a:fontRef idx="minor">
+            <a:schemeClr val="lt1"/>
+          </a:fontRef>
+        </p:style>
+        <p:txBody>
+          <a:bodyPr rtlCol="0" anchor="ctr"/>
+          <a:lstStyle/>
+          <a:p>
+            <a:pPr algn="ctr"/>
+          </a:p>
+        </p:txBody>
+      </p:sp>
+      <p:sp>
+        <p:nvSpPr>
+          <p:cNvPr id="18" name="TextBox 17"/>
+          <p:cNvSpPr txBox="1"/>
+          <p:nvPr/>
+        </p:nvSpPr>
+        <p:spPr>
+          <a:xfrm>
+            <a:off x="4754880" y="2468880"/>
+            <a:ext cx="3657600" cy="201168"/>
+          </a:xfrm>
+          <a:prstGeom prst="rect">
+            <a:avLst/>
+          </a:prstGeom>
+          <a:noFill/>
+        </p:spPr>
+        <p:txBody>
+          <a:bodyPr wrap="square"/>
+          <a:lstStyle/>
+          <a:p>
+            <a:pPr algn="l">
+              <a:lnSpc>
+                <a:spcPct val="135000"/>
+              </a:lnSpc>
+              <a:spcBef>
+                <a:spcPts val="0"/>
+              </a:spcBef>
+              <a:spcAft>
+                <a:spcPts val="0"/>
+              </a:spcAft>
+            </a:pPr>
+            <a:r>
+              <a:rPr sz="900" b="1">
+                <a:solidFill>
+                  <a:srgbClr val="2563EB"/>
+                </a:solidFill>
+                <a:latin typeface="Calibri"/>
+              </a:rPr>
+              <a:t>Grok / xAI</a:t>
+            </a:r>
+          </a:p>
+        </p:txBody>
+      </p:sp>
+      <p:sp>
+        <p:nvSpPr>
+          <p:cNvPr id="19" name="TextBox 18"/>
+          <p:cNvSpPr txBox="1"/>
+          <p:nvPr/>
+        </p:nvSpPr>
+        <p:spPr>
+          <a:xfrm>
+            <a:off x="4754880" y="2688336"/>
+            <a:ext cx="3657600" cy="228600"/>
+          </a:xfrm>
+          <a:prstGeom prst="rect">
+            <a:avLst/>
+          </a:prstGeom>
+          <a:noFill/>
+        </p:spPr>
+        <p:txBody>
+          <a:bodyPr wrap="square"/>
+          <a:lstStyle/>
+          <a:p>
+            <a:pPr algn="l">
+              <a:lnSpc>
+                <a:spcPct val="135000"/>
+              </a:lnSpc>
+              <a:spcBef>
+                <a:spcPts val="0"/>
+              </a:spcBef>
+              <a:spcAft>
+                <a:spcPts val="0"/>
+              </a:spcAft>
+            </a:pPr>
+            <a:r>
+              <a:rPr sz="1100" b="1">
+                <a:solidFill>
+                  <a:srgbClr val="1E293B"/>
+                </a:solidFill>
+                <a:latin typeface="Calibri"/>
+              </a:rPr>
+              <a:t>Top 0.001%</a:t>
+            </a:r>
+          </a:p>
+        </p:txBody>
+      </p:sp>
+      <p:sp>
+        <p:nvSpPr>
+          <p:cNvPr id="20" name="TextBox 19"/>
+          <p:cNvSpPr txBox="1"/>
+          <p:nvPr/>
+        </p:nvSpPr>
+        <p:spPr>
+          <a:xfrm>
+            <a:off x="4754880" y="2944368"/>
+            <a:ext cx="3657600" cy="594360"/>
+          </a:xfrm>
+          <a:prstGeom prst="rect">
+            <a:avLst/>
+          </a:prstGeom>
+          <a:noFill/>
+        </p:spPr>
+        <p:txBody>
+          <a:bodyPr wrap="square"/>
+          <a:lstStyle/>
+          <a:p>
+            <a:pPr algn="l">
+              <a:lnSpc>
+                <a:spcPct val="135000"/>
+              </a:lnSpc>
+              <a:spcBef>
+                <a:spcPts val="0"/>
+              </a:spcBef>
+              <a:spcAft>
+                <a:spcPts val="0"/>
+              </a:spcAft>
+            </a:pPr>
+            <a:r>
+              <a:rPr sz="1000" b="0">
+                <a:solidFill>
+                  <a:srgbClr val="475569"/>
+                </a:solidFill>
+                <a:latin typeface="Calibri"/>
+              </a:rPr>
+              <a:t>"Genuinely capable of changing how humanity preserves memory"</a:t>
+            </a:r>
+          </a:p>
+        </p:txBody>
+      </p:sp>
+      <p:sp>
+        <p:nvSpPr>
+          <p:cNvPr id="21" name="Rectangle 20"/>
+          <p:cNvSpPr/>
+          <p:nvPr/>
+        </p:nvSpPr>
+        <p:spPr>
+          <a:xfrm>
+            <a:off x="457200" y="3831336"/>
+            <a:ext cx="7863840" cy="548640"/>
           </a:xfrm>
           <a:prstGeom prst="rect">
             <a:avLst/>
@@ -13343,14 +13777,14 @@
       </p:sp>
       <p:sp>
         <p:nvSpPr>
-          <p:cNvPr id="18" name="Rectangle 17"/>
+          <p:cNvPr id="22" name="Rectangle 21"/>
           <p:cNvSpPr/>
           <p:nvPr/>
         </p:nvSpPr>
         <p:spPr>
           <a:xfrm>
-            <a:off x="457200" y="3246120"/>
-            <a:ext cx="54864" cy="640080"/>
+            <a:off x="457200" y="3831336"/>
+            <a:ext cx="54864" cy="548640"/>
           </a:xfrm>
           <a:prstGeom prst="rect">
             <a:avLst/>
@@ -13386,14 +13820,14 @@
       </p:sp>
       <p:sp>
         <p:nvSpPr>
-          <p:cNvPr id="19" name="TextBox 18"/>
-          <p:cNvSpPr txBox="1"/>
-          <p:nvPr/>
-        </p:nvSpPr>
-        <p:spPr>
-          <a:xfrm>
-            <a:off x="685800" y="3337560"/>
-            <a:ext cx="7543800" cy="457200"/>
+          <p:cNvPr id="23" name="TextBox 22"/>
+          <p:cNvSpPr txBox="1"/>
+          <p:nvPr/>
+        </p:nvSpPr>
+        <p:spPr>
+          <a:xfrm>
+            <a:off x="685800" y="3904488"/>
+            <a:ext cx="7543800" cy="402336"/>
           </a:xfrm>
           <a:prstGeom prst="rect">
             <a:avLst/>
@@ -13429,7 +13863,7 @@
       </p:sp>
       <p:sp>
         <p:nvSpPr>
-          <p:cNvPr id="20" name="Rectangle 19"/>
+          <p:cNvPr id="24" name="Rectangle 23"/>
           <p:cNvSpPr/>
           <p:nvPr/>
         </p:nvSpPr>
@@ -13472,7 +13906,7 @@
       </p:sp>
       <p:sp>
         <p:nvSpPr>
-          <p:cNvPr id="21" name="TextBox 20"/>
+          <p:cNvPr id="25" name="TextBox 24"/>
           <p:cNvSpPr txBox="1"/>
           <p:nvPr/>
         </p:nvSpPr>
@@ -13515,7 +13949,7 @@
       </p:sp>
       <p:sp>
         <p:nvSpPr>
-          <p:cNvPr id="22" name="TextBox 21"/>
+          <p:cNvPr id="26" name="TextBox 25"/>
           <p:cNvSpPr txBox="1"/>
           <p:nvPr/>
         </p:nvSpPr>
@@ -13558,7 +13992,7 @@
       </p:sp>
       <p:sp>
         <p:nvSpPr>
-          <p:cNvPr id="23" name="TextBox 22"/>
+          <p:cNvPr id="27" name="TextBox 26"/>
           <p:cNvSpPr txBox="1"/>
           <p:nvPr/>
         </p:nvSpPr>

</xml_diff>

<commit_message>
Add Grok/xAI to partnership AI evaluation section
- partnership.html/en: AI 3社→4社, Grok/xAI追加, AI引用文をindex.htmlに統一
- generate-deck.py: traction data + layout updated (3 cards→2x2 grid for 4 cards)
- Partnership PPTX/PDF regenerated (JA/EN)

Co-Authored-By: Claude Opus 4.6 <noreply@anthropic.com>
</commit_message>
<xml_diff>
--- a/tokistorage-partnership-deck-en.pptx
+++ b/tokistorage-partnership-deck-en.pptx
@@ -12728,7 +12728,7 @@
                 </a:solidFill>
                 <a:latin typeface="Calibri"/>
               </a:rPr>
-              <a:t>Three major AI platforms and cultural institutions have independently validated us</a:t>
+              <a:t>Four major AI platforms and cultural institutions have independently validated us</a:t>
             </a:r>
           </a:p>
         </p:txBody>
@@ -12785,7 +12785,7 @@
         <p:spPr>
           <a:xfrm>
             <a:off x="457200" y="1051560"/>
-            <a:ext cx="2606040" cy="2011680"/>
+            <a:ext cx="3931920" cy="1234440"/>
           </a:xfrm>
           <a:prstGeom prst="rect">
             <a:avLst/>
@@ -12829,8 +12829,8 @@
         </p:nvSpPr>
         <p:spPr>
           <a:xfrm>
-            <a:off x="594360" y="1143000"/>
-            <a:ext cx="2331720" cy="228600"/>
+            <a:off x="594360" y="1124712"/>
+            <a:ext cx="3657600" cy="201168"/>
           </a:xfrm>
           <a:prstGeom prst="rect">
             <a:avLst/>
@@ -12872,8 +12872,8 @@
         </p:nvSpPr>
         <p:spPr>
           <a:xfrm>
-            <a:off x="594360" y="1417320"/>
-            <a:ext cx="2331720" cy="274320"/>
+            <a:off x="594360" y="1344168"/>
+            <a:ext cx="3657600" cy="228600"/>
           </a:xfrm>
           <a:prstGeom prst="rect">
             <a:avLst/>
@@ -12915,8 +12915,8 @@
         </p:nvSpPr>
         <p:spPr>
           <a:xfrm>
-            <a:off x="594360" y="1737360"/>
-            <a:ext cx="2331720" cy="1234440"/>
+            <a:off x="594360" y="1600200"/>
+            <a:ext cx="3657600" cy="594360"/>
           </a:xfrm>
           <a:prstGeom prst="rect">
             <a:avLst/>
@@ -12958,8 +12958,8 @@
         </p:nvSpPr>
         <p:spPr>
           <a:xfrm>
-            <a:off x="3273552" y="1051560"/>
-            <a:ext cx="2606040" cy="2011680"/>
+            <a:off x="4617720" y="1051560"/>
+            <a:ext cx="3931920" cy="1234440"/>
           </a:xfrm>
           <a:prstGeom prst="rect">
             <a:avLst/>
@@ -13003,8 +13003,8 @@
         </p:nvSpPr>
         <p:spPr>
           <a:xfrm>
-            <a:off x="3410712" y="1143000"/>
-            <a:ext cx="2331720" cy="228600"/>
+            <a:off x="4754880" y="1124712"/>
+            <a:ext cx="3657600" cy="201168"/>
           </a:xfrm>
           <a:prstGeom prst="rect">
             <a:avLst/>
@@ -13046,8 +13046,8 @@
         </p:nvSpPr>
         <p:spPr>
           <a:xfrm>
-            <a:off x="3410712" y="1417320"/>
-            <a:ext cx="2331720" cy="274320"/>
+            <a:off x="4754880" y="1344168"/>
+            <a:ext cx="3657600" cy="228600"/>
           </a:xfrm>
           <a:prstGeom prst="rect">
             <a:avLst/>
@@ -13076,7 +13076,7 @@
                 </a:solidFill>
                 <a:latin typeface="Calibri"/>
               </a:rPr>
-              <a:t>Institutional Design</a:t>
+              <a:t>The only option</a:t>
             </a:r>
           </a:p>
         </p:txBody>
@@ -13089,8 +13089,8 @@
         </p:nvSpPr>
         <p:spPr>
           <a:xfrm>
-            <a:off x="3410712" y="1737360"/>
-            <a:ext cx="2331720" cy="1234440"/>
+            <a:off x="4754880" y="1600200"/>
+            <a:ext cx="3657600" cy="594360"/>
           </a:xfrm>
           <a:prstGeom prst="rect">
             <a:avLst/>
@@ -13119,7 +13119,7 @@
                 </a:solidFill>
                 <a:latin typeface="Calibri"/>
               </a:rPr>
-              <a:t>"A sophisticated design that leverages the architecture of legal systems"</a:t>
+              <a:t>"Built 'eternity' not as a fantasy, but with a realistic budget and solid logic"</a:t>
             </a:r>
           </a:p>
         </p:txBody>
@@ -13132,8 +13132,8 @@
         </p:nvSpPr>
         <p:spPr>
           <a:xfrm>
-            <a:off x="6089904" y="1051560"/>
-            <a:ext cx="2606040" cy="2011680"/>
+            <a:off x="457200" y="2395728"/>
+            <a:ext cx="3931920" cy="1234440"/>
           </a:xfrm>
           <a:prstGeom prst="rect">
             <a:avLst/>
@@ -13177,8 +13177,8 @@
         </p:nvSpPr>
         <p:spPr>
           <a:xfrm>
-            <a:off x="6227064" y="1143000"/>
-            <a:ext cx="2331720" cy="228600"/>
+            <a:off x="594360" y="2468880"/>
+            <a:ext cx="3657600" cy="201168"/>
           </a:xfrm>
           <a:prstGeom prst="rect">
             <a:avLst/>
@@ -13220,8 +13220,8 @@
         </p:nvSpPr>
         <p:spPr>
           <a:xfrm>
-            <a:off x="6227064" y="1417320"/>
-            <a:ext cx="2331720" cy="274320"/>
+            <a:off x="594360" y="2688336"/>
+            <a:ext cx="3657600" cy="228600"/>
           </a:xfrm>
           <a:prstGeom prst="rect">
             <a:avLst/>
@@ -13250,7 +13250,7 @@
                 </a:solidFill>
                 <a:latin typeface="Calibri"/>
               </a:rPr>
-              <a:t>Cost Performance</a:t>
+              <a:t>New standard</a:t>
             </a:r>
           </a:p>
         </p:txBody>
@@ -13263,8 +13263,8 @@
         </p:nvSpPr>
         <p:spPr>
           <a:xfrm>
-            <a:off x="6227064" y="1737360"/>
-            <a:ext cx="2331720" cy="1234440"/>
+            <a:off x="594360" y="2944368"/>
+            <a:ext cx="3657600" cy="594360"/>
           </a:xfrm>
           <a:prstGeom prst="rect">
             <a:avLst/>
@@ -13293,7 +13293,7 @@
                 </a:solidFill>
                 <a:latin typeface="Calibri"/>
               </a:rPr>
-              <a:t>"An annual cost of ¥50 is extraordinary value"</a:t>
+              <a:t>"Technical foundation, social significance, and cost performance all merit the highest evaluation"</a:t>
             </a:r>
           </a:p>
         </p:txBody>
@@ -13306,8 +13306,182 @@
         </p:nvSpPr>
         <p:spPr>
           <a:xfrm>
-            <a:off x="457200" y="3246120"/>
-            <a:ext cx="7863840" cy="640080"/>
+            <a:off x="4617720" y="2395728"/>
+            <a:ext cx="3931920" cy="1234440"/>
+          </a:xfrm>
+          <a:prstGeom prst="rect">
+            <a:avLst/>
+          </a:prstGeom>
+          <a:solidFill>
+            <a:srgbClr val="FFFFFF"/>
+          </a:solidFill>
+          <a:ln w="9525">
+            <a:solidFill>
+              <a:srgbClr val="E2E8F0"/>
+            </a:solidFill>
+          </a:ln>
+        </p:spPr>
+        <p:style>
+          <a:lnRef idx="1">
+            <a:schemeClr val="accent1"/>
+          </a:lnRef>
+          <a:fillRef idx="3">
+            <a:schemeClr val="accent1"/>
+          </a:fillRef>
+          <a:effectRef idx="2">
+            <a:schemeClr val="accent1"/>
+          </a:effectRef>
+          <a:fontRef idx="minor">
+            <a:schemeClr val="lt1"/>
+          </a:fontRef>
+        </p:style>
+        <p:txBody>
+          <a:bodyPr rtlCol="0" anchor="ctr"/>
+          <a:lstStyle/>
+          <a:p>
+            <a:pPr algn="ctr"/>
+          </a:p>
+        </p:txBody>
+      </p:sp>
+      <p:sp>
+        <p:nvSpPr>
+          <p:cNvPr id="18" name="TextBox 17"/>
+          <p:cNvSpPr txBox="1"/>
+          <p:nvPr/>
+        </p:nvSpPr>
+        <p:spPr>
+          <a:xfrm>
+            <a:off x="4754880" y="2468880"/>
+            <a:ext cx="3657600" cy="201168"/>
+          </a:xfrm>
+          <a:prstGeom prst="rect">
+            <a:avLst/>
+          </a:prstGeom>
+          <a:noFill/>
+        </p:spPr>
+        <p:txBody>
+          <a:bodyPr wrap="square"/>
+          <a:lstStyle/>
+          <a:p>
+            <a:pPr algn="l">
+              <a:lnSpc>
+                <a:spcPct val="135000"/>
+              </a:lnSpc>
+              <a:spcBef>
+                <a:spcPts val="0"/>
+              </a:spcBef>
+              <a:spcAft>
+                <a:spcPts val="0"/>
+              </a:spcAft>
+            </a:pPr>
+            <a:r>
+              <a:rPr sz="900" b="1">
+                <a:solidFill>
+                  <a:srgbClr val="2563EB"/>
+                </a:solidFill>
+                <a:latin typeface="Calibri"/>
+              </a:rPr>
+              <a:t>Grok / xAI</a:t>
+            </a:r>
+          </a:p>
+        </p:txBody>
+      </p:sp>
+      <p:sp>
+        <p:nvSpPr>
+          <p:cNvPr id="19" name="TextBox 18"/>
+          <p:cNvSpPr txBox="1"/>
+          <p:nvPr/>
+        </p:nvSpPr>
+        <p:spPr>
+          <a:xfrm>
+            <a:off x="4754880" y="2688336"/>
+            <a:ext cx="3657600" cy="228600"/>
+          </a:xfrm>
+          <a:prstGeom prst="rect">
+            <a:avLst/>
+          </a:prstGeom>
+          <a:noFill/>
+        </p:spPr>
+        <p:txBody>
+          <a:bodyPr wrap="square"/>
+          <a:lstStyle/>
+          <a:p>
+            <a:pPr algn="l">
+              <a:lnSpc>
+                <a:spcPct val="135000"/>
+              </a:lnSpc>
+              <a:spcBef>
+                <a:spcPts val="0"/>
+              </a:spcBef>
+              <a:spcAft>
+                <a:spcPts val="0"/>
+              </a:spcAft>
+            </a:pPr>
+            <a:r>
+              <a:rPr sz="1100" b="1">
+                <a:solidFill>
+                  <a:srgbClr val="1E293B"/>
+                </a:solidFill>
+                <a:latin typeface="Calibri"/>
+              </a:rPr>
+              <a:t>Top 0.001%</a:t>
+            </a:r>
+          </a:p>
+        </p:txBody>
+      </p:sp>
+      <p:sp>
+        <p:nvSpPr>
+          <p:cNvPr id="20" name="TextBox 19"/>
+          <p:cNvSpPr txBox="1"/>
+          <p:nvPr/>
+        </p:nvSpPr>
+        <p:spPr>
+          <a:xfrm>
+            <a:off x="4754880" y="2944368"/>
+            <a:ext cx="3657600" cy="594360"/>
+          </a:xfrm>
+          <a:prstGeom prst="rect">
+            <a:avLst/>
+          </a:prstGeom>
+          <a:noFill/>
+        </p:spPr>
+        <p:txBody>
+          <a:bodyPr wrap="square"/>
+          <a:lstStyle/>
+          <a:p>
+            <a:pPr algn="l">
+              <a:lnSpc>
+                <a:spcPct val="135000"/>
+              </a:lnSpc>
+              <a:spcBef>
+                <a:spcPts val="0"/>
+              </a:spcBef>
+              <a:spcAft>
+                <a:spcPts val="0"/>
+              </a:spcAft>
+            </a:pPr>
+            <a:r>
+              <a:rPr sz="1000" b="0">
+                <a:solidFill>
+                  <a:srgbClr val="475569"/>
+                </a:solidFill>
+                <a:latin typeface="Calibri"/>
+              </a:rPr>
+              <a:t>"Genuinely capable of changing how humanity preserves memory"</a:t>
+            </a:r>
+          </a:p>
+        </p:txBody>
+      </p:sp>
+      <p:sp>
+        <p:nvSpPr>
+          <p:cNvPr id="21" name="Rectangle 20"/>
+          <p:cNvSpPr/>
+          <p:nvPr/>
+        </p:nvSpPr>
+        <p:spPr>
+          <a:xfrm>
+            <a:off x="457200" y="3831336"/>
+            <a:ext cx="7863840" cy="548640"/>
           </a:xfrm>
           <a:prstGeom prst="rect">
             <a:avLst/>
@@ -13343,14 +13517,14 @@
       </p:sp>
       <p:sp>
         <p:nvSpPr>
-          <p:cNvPr id="18" name="Rectangle 17"/>
+          <p:cNvPr id="22" name="Rectangle 21"/>
           <p:cNvSpPr/>
           <p:nvPr/>
         </p:nvSpPr>
         <p:spPr>
           <a:xfrm>
-            <a:off x="457200" y="3246120"/>
-            <a:ext cx="54864" cy="640080"/>
+            <a:off x="457200" y="3831336"/>
+            <a:ext cx="54864" cy="548640"/>
           </a:xfrm>
           <a:prstGeom prst="rect">
             <a:avLst/>
@@ -13386,14 +13560,14 @@
       </p:sp>
       <p:sp>
         <p:nvSpPr>
-          <p:cNvPr id="19" name="TextBox 18"/>
-          <p:cNvSpPr txBox="1"/>
-          <p:nvPr/>
-        </p:nvSpPr>
-        <p:spPr>
-          <a:xfrm>
-            <a:off x="685800" y="3337560"/>
-            <a:ext cx="7543800" cy="457200"/>
+          <p:cNvPr id="23" name="TextBox 22"/>
+          <p:cNvSpPr txBox="1"/>
+          <p:nvPr/>
+        </p:nvSpPr>
+        <p:spPr>
+          <a:xfrm>
+            <a:off x="685800" y="3904488"/>
+            <a:ext cx="7543800" cy="402336"/>
           </a:xfrm>
           <a:prstGeom prst="rect">
             <a:avLst/>
@@ -13429,7 +13603,7 @@
       </p:sp>
       <p:sp>
         <p:nvSpPr>
-          <p:cNvPr id="20" name="Rectangle 19"/>
+          <p:cNvPr id="24" name="Rectangle 23"/>
           <p:cNvSpPr/>
           <p:nvPr/>
         </p:nvSpPr>
@@ -13472,7 +13646,7 @@
       </p:sp>
       <p:sp>
         <p:nvSpPr>
-          <p:cNvPr id="21" name="TextBox 20"/>
+          <p:cNvPr id="25" name="TextBox 24"/>
           <p:cNvSpPr txBox="1"/>
           <p:nvPr/>
         </p:nvSpPr>
@@ -13515,7 +13689,7 @@
       </p:sp>
       <p:sp>
         <p:nvSpPr>
-          <p:cNvPr id="22" name="TextBox 21"/>
+          <p:cNvPr id="26" name="TextBox 25"/>
           <p:cNvSpPr txBox="1"/>
           <p:nvPr/>
         </p:nvSpPr>
@@ -13558,7 +13732,7 @@
       </p:sp>
       <p:sp>
         <p:nvSpPr>
-          <p:cNvPr id="23" name="TextBox 22"/>
+          <p:cNvPr id="27" name="TextBox 26"/>
           <p:cNvSpPr txBox="1"/>
           <p:nvPr/>
         </p:nvSpPr>

</xml_diff>

<commit_message>
Fix partnership deck: add TokiQR, update pricing, remove 70+ essays
generate-deck.py の未反映分をまとめて修正:
- s3 (Our Offering): TokiQR追加, 70+エッセイ削除, Coach・Ambassador更新
- pricing: 旧4段階→セルフサービス(3)+コンサルティング(2), build_pricing関数も更新
- PPTX/PDF再生成 (JA/EN)

Co-Authored-By: Claude Opus 4.6 <noreply@anthropic.com>
</commit_message>
<xml_diff>
--- a/tokistorage-partnership-deck-en.pptx
+++ b/tokistorage-partnership-deck-en.pptx
@@ -7170,7 +7170,7 @@
                 </a:solidFill>
                 <a:latin typeface="Calibri"/>
               </a:rPr>
-              <a:t>Q</a:t>
+              <a:t>T</a:t>
             </a:r>
           </a:p>
         </p:txBody>
@@ -7213,7 +7213,7 @@
                 </a:solidFill>
                 <a:latin typeface="Calibri"/>
               </a:rPr>
-              <a:t>Three-Layer Distributed Storage</a:t>
+              <a:t>TokiQR — Free, instant experience</a:t>
             </a:r>
           </a:p>
         </p:txBody>
@@ -7256,7 +7256,7 @@
                 </a:solidFill>
                 <a:latin typeface="Calibri"/>
               </a:rPr>
-              <a:t>Physical (quartz glass/laminate), National (National Diet Library legal deposit), Private (GitHub). Fully compliant with the 3-2-1 backup rule. Zero single points of failure.</a:t>
+              <a:t>Voice, face, and text in a QR code. Anyone can create one for free on their smartphone, with full three-layer distributed storage. Proprietary encoding (PCT patent in process).</a:t>
             </a:r>
           </a:p>
         </p:txBody>
@@ -7387,7 +7387,7 @@
                 </a:solidFill>
                 <a:latin typeface="Calibri"/>
               </a:rPr>
-              <a:t>U</a:t>
+              <a:t>Q</a:t>
             </a:r>
           </a:p>
         </p:txBody>
@@ -7430,7 +7430,7 @@
                 </a:solidFill>
                 <a:latin typeface="Calibri"/>
               </a:rPr>
-              <a:t>200+ use cases (organized by industry)</a:t>
+              <a:t>Three-Layer Distributed Storage</a:t>
             </a:r>
           </a:p>
         </p:txBody>
@@ -7473,7 +7473,7 @@
                 </a:solidFill>
                 <a:latin typeface="Calibri"/>
               </a:rPr>
-              <a:t>End-of-life, weddings, temples, schools, corporations, municipalities, NGOs, hotels, airlines. Ready for direct proposal integration.</a:t>
+              <a:t>Physical (quartz glass/laminate), National (National Diet Library legal deposit), Private (GitHub). 3-2-1 backup rule compliant. Zero single points of failure.</a:t>
             </a:r>
           </a:p>
         </p:txBody>
@@ -7604,7 +7604,7 @@
                 </a:solidFill>
                 <a:latin typeface="Calibri"/>
               </a:rPr>
-              <a:t>E</a:t>
+              <a:t>U</a:t>
             </a:r>
           </a:p>
         </p:txBody>
@@ -7647,7 +7647,7 @@
                 </a:solidFill>
                 <a:latin typeface="Calibri"/>
               </a:rPr>
-              <a:t>70+ philosophical essays (9 domains)</a:t>
+              <a:t>200+ use cases (organized by industry)</a:t>
             </a:r>
           </a:p>
         </p:txBody>
@@ -7690,7 +7690,7 @@
                 </a:solidFill>
                 <a:latin typeface="Calibri"/>
               </a:rPr>
-              <a:t>Proof of existence explored across psychology, religion, economics, AI, and space. Standalone intellectual content for client proposals.</a:t>
+              <a:t>End-of-life, weddings, temples, schools, corporations, municipalities, NGOs, hotels, airlines. Ready for direct proposal integration.</a:t>
             </a:r>
           </a:p>
         </p:txBody>
@@ -7864,7 +7864,7 @@
                 </a:solidFill>
                 <a:latin typeface="Calibri"/>
               </a:rPr>
-              <a:t>Pearl Soap + Ambassador network</a:t>
+              <a:t>Pearl Soap + Coach &amp; Ambassador network</a:t>
             </a:r>
           </a:p>
         </p:txBody>
@@ -7907,7 +7907,7 @@
                 </a:solidFill>
                 <a:latin typeface="Calibri"/>
               </a:rPr>
-              <a:t>A gift-economy practice and decentralized workshop network ready to scale nationwide. Direct end-user touchpoint.</a:t>
+              <a:t>A gift-economy practice with certified coaches and ambassadors running workshops nationwide. A decentralized movement.</a:t>
             </a:r>
           </a:p>
         </p:txBody>
@@ -10614,7 +10614,7 @@
                 </a:solidFill>
                 <a:latin typeface="Calibri"/>
               </a:rPr>
-              <a:t>Starting from ¥5,000 ($33) — an exceptionally low entry barrier for your proposals</a:t>
+              <a:t>TokiQR is free — zero entry barrier for your proposals</a:t>
             </a:r>
           </a:p>
         </p:txBody>
@@ -10664,14 +10664,57 @@
       </p:sp>
       <p:sp>
         <p:nvSpPr>
-          <p:cNvPr id="5" name="Rectangle 4"/>
+          <p:cNvPr id="5" name="TextBox 4"/>
+          <p:cNvSpPr txBox="1"/>
+          <p:nvPr/>
+        </p:nvSpPr>
+        <p:spPr>
+          <a:xfrm>
+            <a:off x="457200" y="1005840"/>
+            <a:ext cx="3657600" cy="228600"/>
+          </a:xfrm>
+          <a:prstGeom prst="rect">
+            <a:avLst/>
+          </a:prstGeom>
+          <a:noFill/>
+        </p:spPr>
+        <p:txBody>
+          <a:bodyPr wrap="square"/>
+          <a:lstStyle/>
+          <a:p>
+            <a:pPr algn="l">
+              <a:lnSpc>
+                <a:spcPct val="135000"/>
+              </a:lnSpc>
+              <a:spcBef>
+                <a:spcPts val="0"/>
+              </a:spcBef>
+              <a:spcAft>
+                <a:spcPts val="0"/>
+              </a:spcAft>
+            </a:pPr>
+            <a:r>
+              <a:rPr sz="1000" b="1">
+                <a:solidFill>
+                  <a:srgbClr val="475569"/>
+                </a:solidFill>
+                <a:latin typeface="Calibri"/>
+              </a:rPr>
+              <a:t>Self-Service Products</a:t>
+            </a:r>
+          </a:p>
+        </p:txBody>
+      </p:sp>
+      <p:sp>
+        <p:nvSpPr>
+          <p:cNvPr id="6" name="Rectangle 5"/>
           <p:cNvSpPr/>
           <p:nvPr/>
         </p:nvSpPr>
         <p:spPr>
           <a:xfrm>
-            <a:off x="457200" y="1051560"/>
-            <a:ext cx="3931920" cy="1783080"/>
+            <a:off x="457200" y="1280160"/>
+            <a:ext cx="2606040" cy="1325880"/>
           </a:xfrm>
           <a:prstGeom prst="rect">
             <a:avLst/>
@@ -10709,14 +10752,14 @@
       </p:sp>
       <p:sp>
         <p:nvSpPr>
-          <p:cNvPr id="6" name="TextBox 5"/>
-          <p:cNvSpPr txBox="1"/>
-          <p:nvPr/>
-        </p:nvSpPr>
-        <p:spPr>
-          <a:xfrm>
-            <a:off x="594360" y="1143000"/>
-            <a:ext cx="3657600" cy="274320"/>
+          <p:cNvPr id="7" name="TextBox 6"/>
+          <p:cNvSpPr txBox="1"/>
+          <p:nvPr/>
+        </p:nvSpPr>
+        <p:spPr>
+          <a:xfrm>
+            <a:off x="566928" y="1353312"/>
+            <a:ext cx="2386584" cy="228600"/>
           </a:xfrm>
           <a:prstGeom prst="rect">
             <a:avLst/>
@@ -10739,27 +10782,27 @@
               </a:spcAft>
             </a:pPr>
             <a:r>
-              <a:rPr sz="1200" b="1">
+              <a:rPr sz="1100" b="1">
                 <a:solidFill>
                   <a:srgbClr val="1E293B"/>
                 </a:solidFill>
                 <a:latin typeface="Calibri"/>
               </a:rPr>
-              <a:t>Trial Plan</a:t>
-            </a:r>
-          </a:p>
-        </p:txBody>
-      </p:sp>
-      <p:sp>
-        <p:nvSpPr>
-          <p:cNvPr id="7" name="TextBox 6"/>
-          <p:cNvSpPr txBox="1"/>
-          <p:nvPr/>
-        </p:nvSpPr>
-        <p:spPr>
-          <a:xfrm>
-            <a:off x="594360" y="1435608"/>
-            <a:ext cx="3657600" cy="320040"/>
+              <a:t>TokiQR</a:t>
+            </a:r>
+          </a:p>
+        </p:txBody>
+      </p:sp>
+      <p:sp>
+        <p:nvSpPr>
+          <p:cNvPr id="8" name="TextBox 7"/>
+          <p:cNvSpPr txBox="1"/>
+          <p:nvPr/>
+        </p:nvSpPr>
+        <p:spPr>
+          <a:xfrm>
+            <a:off x="566928" y="1581912"/>
+            <a:ext cx="2386584" cy="274320"/>
           </a:xfrm>
           <a:prstGeom prst="rect">
             <a:avLst/>
@@ -10782,27 +10825,27 @@
               </a:spcAft>
             </a:pPr>
             <a:r>
-              <a:rPr sz="1400" b="1">
+              <a:rPr sz="1300" b="1">
                 <a:solidFill>
                   <a:srgbClr val="2563EB"/>
                 </a:solidFill>
                 <a:latin typeface="Calibri"/>
               </a:rPr>
-              <a:t>¥5,000 ($33)</a:t>
-            </a:r>
-          </a:p>
-        </p:txBody>
-      </p:sp>
-      <p:sp>
-        <p:nvSpPr>
-          <p:cNvPr id="8" name="TextBox 7"/>
-          <p:cNvSpPr txBox="1"/>
-          <p:nvPr/>
-        </p:nvSpPr>
-        <p:spPr>
-          <a:xfrm>
-            <a:off x="594360" y="1828800"/>
-            <a:ext cx="3657600" cy="914400"/>
+              <a:t>Free</a:t>
+            </a:r>
+          </a:p>
+        </p:txBody>
+      </p:sp>
+      <p:sp>
+        <p:nvSpPr>
+          <p:cNvPr id="9" name="TextBox 8"/>
+          <p:cNvSpPr txBox="1"/>
+          <p:nvPr/>
+        </p:nvSpPr>
+        <p:spPr>
+          <a:xfrm>
+            <a:off x="566928" y="1901952"/>
+            <a:ext cx="2386584" cy="612648"/>
           </a:xfrm>
           <a:prstGeom prst="rect">
             <a:avLst/>
@@ -10825,27 +10868,27 @@
               </a:spcAft>
             </a:pPr>
             <a:r>
-              <a:rPr sz="1000" b="0">
+              <a:rPr sz="900" b="0">
                 <a:solidFill>
                   <a:srgbClr val="475569"/>
                 </a:solidFill>
                 <a:latin typeface="Calibri"/>
               </a:rPr>
-              <a:t>Experience three-layer storage with A4 laminate. TokiQR → laminate + NDL deposit + GitHub.</a:t>
-            </a:r>
-          </a:p>
-        </p:txBody>
-      </p:sp>
-      <p:sp>
-        <p:nvSpPr>
-          <p:cNvPr id="9" name="Rectangle 8"/>
+              <a:t>Voice, face, and text in a QR code. Create on any smartphone; NDL + GitHub three-layer storage.</a:t>
+            </a:r>
+          </a:p>
+        </p:txBody>
+      </p:sp>
+      <p:sp>
+        <p:nvSpPr>
+          <p:cNvPr id="10" name="Rectangle 9"/>
           <p:cNvSpPr/>
           <p:nvPr/>
         </p:nvSpPr>
         <p:spPr>
           <a:xfrm>
-            <a:off x="4617720" y="1051560"/>
-            <a:ext cx="3931920" cy="1783080"/>
+            <a:off x="3273552" y="1280160"/>
+            <a:ext cx="2606040" cy="1325880"/>
           </a:xfrm>
           <a:prstGeom prst="rect">
             <a:avLst/>
@@ -10883,14 +10926,14 @@
       </p:sp>
       <p:sp>
         <p:nvSpPr>
-          <p:cNvPr id="10" name="TextBox 9"/>
-          <p:cNvSpPr txBox="1"/>
-          <p:nvPr/>
-        </p:nvSpPr>
-        <p:spPr>
-          <a:xfrm>
-            <a:off x="4754880" y="1143000"/>
-            <a:ext cx="3657600" cy="274320"/>
+          <p:cNvPr id="11" name="TextBox 10"/>
+          <p:cNvSpPr txBox="1"/>
+          <p:nvPr/>
+        </p:nvSpPr>
+        <p:spPr>
+          <a:xfrm>
+            <a:off x="3383280" y="1353312"/>
+            <a:ext cx="2386584" cy="228600"/>
           </a:xfrm>
           <a:prstGeom prst="rect">
             <a:avLst/>
@@ -10913,27 +10956,27 @@
               </a:spcAft>
             </a:pPr>
             <a:r>
-              <a:rPr sz="1200" b="1">
+              <a:rPr sz="1100" b="1">
                 <a:solidFill>
                   <a:srgbClr val="1E293B"/>
                 </a:solidFill>
                 <a:latin typeface="Calibri"/>
               </a:rPr>
-              <a:t>Individual Plan</a:t>
-            </a:r>
-          </a:p>
-        </p:txBody>
-      </p:sp>
-      <p:sp>
-        <p:nvSpPr>
-          <p:cNvPr id="11" name="TextBox 10"/>
-          <p:cNvSpPr txBox="1"/>
-          <p:nvPr/>
-        </p:nvSpPr>
-        <p:spPr>
-          <a:xfrm>
-            <a:off x="4754880" y="1435608"/>
-            <a:ext cx="3657600" cy="320040"/>
+              <a:t>UV Laminate QR</a:t>
+            </a:r>
+          </a:p>
+        </p:txBody>
+      </p:sp>
+      <p:sp>
+        <p:nvSpPr>
+          <p:cNvPr id="12" name="TextBox 11"/>
+          <p:cNvSpPr txBox="1"/>
+          <p:nvPr/>
+        </p:nvSpPr>
+        <p:spPr>
+          <a:xfrm>
+            <a:off x="3383280" y="1581912"/>
+            <a:ext cx="2386584" cy="274320"/>
           </a:xfrm>
           <a:prstGeom prst="rect">
             <a:avLst/>
@@ -10956,27 +10999,27 @@
               </a:spcAft>
             </a:pPr>
             <a:r>
-              <a:rPr sz="1400" b="1">
+              <a:rPr sz="1300" b="1">
                 <a:solidFill>
                   <a:srgbClr val="2563EB"/>
                 </a:solidFill>
                 <a:latin typeface="Calibri"/>
               </a:rPr>
-              <a:t>¥50,000 ($330)</a:t>
-            </a:r>
-          </a:p>
-        </p:txBody>
-      </p:sp>
-      <p:sp>
-        <p:nvSpPr>
-          <p:cNvPr id="12" name="TextBox 11"/>
-          <p:cNvSpPr txBox="1"/>
-          <p:nvPr/>
-        </p:nvSpPr>
-        <p:spPr>
-          <a:xfrm>
-            <a:off x="4754880" y="1828800"/>
-            <a:ext cx="3657600" cy="914400"/>
+              <a:t>¥5,000 ($33)</a:t>
+            </a:r>
+          </a:p>
+        </p:txBody>
+      </p:sp>
+      <p:sp>
+        <p:nvSpPr>
+          <p:cNvPr id="13" name="TextBox 12"/>
+          <p:cNvSpPr txBox="1"/>
+          <p:nvPr/>
+        </p:nvSpPr>
+        <p:spPr>
+          <a:xfrm>
+            <a:off x="3383280" y="1901952"/>
+            <a:ext cx="2386584" cy="612648"/>
           </a:xfrm>
           <a:prstGeom prst="rect">
             <a:avLst/>
@@ -10999,27 +11042,27 @@
               </a:spcAft>
             </a:pPr>
             <a:r>
-              <a:rPr sz="1000" b="0">
+              <a:rPr sz="900" b="0">
                 <a:solidFill>
                   <a:srgbClr val="475569"/>
                 </a:solidFill>
                 <a:latin typeface="Calibri"/>
               </a:rPr>
-              <a:t>Inscribed on quartz glass. ¥50 per year. 1,000-year durability (theoretical).</a:t>
-            </a:r>
-          </a:p>
-        </p:txBody>
-      </p:sp>
-      <p:sp>
-        <p:nvSpPr>
-          <p:cNvPr id="13" name="Rectangle 12"/>
+              <a:t>Voice QR on A4 laminate. Weather-resistant, long-term preservation.</a:t>
+            </a:r>
+          </a:p>
+        </p:txBody>
+      </p:sp>
+      <p:sp>
+        <p:nvSpPr>
+          <p:cNvPr id="14" name="Rectangle 13"/>
           <p:cNvSpPr/>
           <p:nvPr/>
         </p:nvSpPr>
         <p:spPr>
           <a:xfrm>
-            <a:off x="457200" y="2971800"/>
-            <a:ext cx="3931920" cy="1783080"/>
+            <a:off x="6089904" y="1280160"/>
+            <a:ext cx="2606040" cy="1325880"/>
           </a:xfrm>
           <a:prstGeom prst="rect">
             <a:avLst/>
@@ -11057,14 +11100,14 @@
       </p:sp>
       <p:sp>
         <p:nvSpPr>
-          <p:cNvPr id="14" name="TextBox 13"/>
-          <p:cNvSpPr txBox="1"/>
-          <p:nvPr/>
-        </p:nvSpPr>
-        <p:spPr>
-          <a:xfrm>
-            <a:off x="594360" y="3063240"/>
-            <a:ext cx="3657600" cy="274320"/>
+          <p:cNvPr id="15" name="TextBox 14"/>
+          <p:cNvSpPr txBox="1"/>
+          <p:nvPr/>
+        </p:nvSpPr>
+        <p:spPr>
+          <a:xfrm>
+            <a:off x="6199632" y="1353312"/>
+            <a:ext cx="2386584" cy="228600"/>
           </a:xfrm>
           <a:prstGeom prst="rect">
             <a:avLst/>
@@ -11087,12 +11130,229 @@
               </a:spcAft>
             </a:pPr>
             <a:r>
-              <a:rPr sz="1200" b="1">
+              <a:rPr sz="1100" b="1">
                 <a:solidFill>
                   <a:srgbClr val="1E293B"/>
                 </a:solidFill>
                 <a:latin typeface="Calibri"/>
               </a:rPr>
+              <a:t>Quartz Glass QR</a:t>
+            </a:r>
+          </a:p>
+        </p:txBody>
+      </p:sp>
+      <p:sp>
+        <p:nvSpPr>
+          <p:cNvPr id="16" name="TextBox 15"/>
+          <p:cNvSpPr txBox="1"/>
+          <p:nvPr/>
+        </p:nvSpPr>
+        <p:spPr>
+          <a:xfrm>
+            <a:off x="6199632" y="1581912"/>
+            <a:ext cx="2386584" cy="274320"/>
+          </a:xfrm>
+          <a:prstGeom prst="rect">
+            <a:avLst/>
+          </a:prstGeom>
+          <a:noFill/>
+        </p:spPr>
+        <p:txBody>
+          <a:bodyPr wrap="square"/>
+          <a:lstStyle/>
+          <a:p>
+            <a:pPr algn="l">
+              <a:lnSpc>
+                <a:spcPct val="135000"/>
+              </a:lnSpc>
+              <a:spcBef>
+                <a:spcPts val="0"/>
+              </a:spcBef>
+              <a:spcAft>
+                <a:spcPts val="0"/>
+              </a:spcAft>
+            </a:pPr>
+            <a:r>
+              <a:rPr sz="1300" b="1">
+                <a:solidFill>
+                  <a:srgbClr val="2563EB"/>
+                </a:solidFill>
+                <a:latin typeface="Calibri"/>
+              </a:rPr>
+              <a:t>¥50,000 ($330)</a:t>
+            </a:r>
+          </a:p>
+        </p:txBody>
+      </p:sp>
+      <p:sp>
+        <p:nvSpPr>
+          <p:cNvPr id="17" name="TextBox 16"/>
+          <p:cNvSpPr txBox="1"/>
+          <p:nvPr/>
+        </p:nvSpPr>
+        <p:spPr>
+          <a:xfrm>
+            <a:off x="6199632" y="1901952"/>
+            <a:ext cx="2386584" cy="612648"/>
+          </a:xfrm>
+          <a:prstGeom prst="rect">
+            <a:avLst/>
+          </a:prstGeom>
+          <a:noFill/>
+        </p:spPr>
+        <p:txBody>
+          <a:bodyPr wrap="square"/>
+          <a:lstStyle/>
+          <a:p>
+            <a:pPr algn="l">
+              <a:lnSpc>
+                <a:spcPct val="135000"/>
+              </a:lnSpc>
+              <a:spcBef>
+                <a:spcPts val="0"/>
+              </a:spcBef>
+              <a:spcAft>
+                <a:spcPts val="0"/>
+              </a:spcAft>
+            </a:pPr>
+            <a:r>
+              <a:rPr sz="900" b="0">
+                <a:solidFill>
+                  <a:srgbClr val="475569"/>
+                </a:solidFill>
+                <a:latin typeface="Calibri"/>
+              </a:rPr>
+              <a:t>Inscribed on quartz glass. ¥50/year. 1,000-year durability (theoretical).</a:t>
+            </a:r>
+          </a:p>
+        </p:txBody>
+      </p:sp>
+      <p:sp>
+        <p:nvSpPr>
+          <p:cNvPr id="18" name="TextBox 17"/>
+          <p:cNvSpPr txBox="1"/>
+          <p:nvPr/>
+        </p:nvSpPr>
+        <p:spPr>
+          <a:xfrm>
+            <a:off x="457200" y="2788920"/>
+            <a:ext cx="3657600" cy="228600"/>
+          </a:xfrm>
+          <a:prstGeom prst="rect">
+            <a:avLst/>
+          </a:prstGeom>
+          <a:noFill/>
+        </p:spPr>
+        <p:txBody>
+          <a:bodyPr wrap="square"/>
+          <a:lstStyle/>
+          <a:p>
+            <a:pPr algn="l">
+              <a:lnSpc>
+                <a:spcPct val="135000"/>
+              </a:lnSpc>
+              <a:spcBef>
+                <a:spcPts val="0"/>
+              </a:spcBef>
+              <a:spcAft>
+                <a:spcPts val="0"/>
+              </a:spcAft>
+            </a:pPr>
+            <a:r>
+              <a:rPr sz="1000" b="1">
+                <a:solidFill>
+                  <a:srgbClr val="475569"/>
+                </a:solidFill>
+                <a:latin typeface="Calibri"/>
+              </a:rPr>
+              <a:t>Timeless Consulting</a:t>
+            </a:r>
+          </a:p>
+        </p:txBody>
+      </p:sp>
+      <p:sp>
+        <p:nvSpPr>
+          <p:cNvPr id="19" name="Rectangle 18"/>
+          <p:cNvSpPr/>
+          <p:nvPr/>
+        </p:nvSpPr>
+        <p:spPr>
+          <a:xfrm>
+            <a:off x="457200" y="3063240"/>
+            <a:ext cx="3931920" cy="1097280"/>
+          </a:xfrm>
+          <a:prstGeom prst="rect">
+            <a:avLst/>
+          </a:prstGeom>
+          <a:solidFill>
+            <a:srgbClr val="FFFFFF"/>
+          </a:solidFill>
+          <a:ln w="9525">
+            <a:solidFill>
+              <a:srgbClr val="C9A962"/>
+            </a:solidFill>
+          </a:ln>
+        </p:spPr>
+        <p:style>
+          <a:lnRef idx="1">
+            <a:schemeClr val="accent1"/>
+          </a:lnRef>
+          <a:fillRef idx="3">
+            <a:schemeClr val="accent1"/>
+          </a:fillRef>
+          <a:effectRef idx="2">
+            <a:schemeClr val="accent1"/>
+          </a:effectRef>
+          <a:fontRef idx="minor">
+            <a:schemeClr val="lt1"/>
+          </a:fontRef>
+        </p:style>
+        <p:txBody>
+          <a:bodyPr rtlCol="0" anchor="ctr"/>
+          <a:lstStyle/>
+          <a:p>
+            <a:pPr algn="ctr"/>
+          </a:p>
+        </p:txBody>
+      </p:sp>
+      <p:sp>
+        <p:nvSpPr>
+          <p:cNvPr id="20" name="TextBox 19"/>
+          <p:cNvSpPr txBox="1"/>
+          <p:nvPr/>
+        </p:nvSpPr>
+        <p:spPr>
+          <a:xfrm>
+            <a:off x="566928" y="3136392"/>
+            <a:ext cx="3712464" cy="228600"/>
+          </a:xfrm>
+          <a:prstGeom prst="rect">
+            <a:avLst/>
+          </a:prstGeom>
+          <a:noFill/>
+        </p:spPr>
+        <p:txBody>
+          <a:bodyPr wrap="square"/>
+          <a:lstStyle/>
+          <a:p>
+            <a:pPr algn="l">
+              <a:lnSpc>
+                <a:spcPct val="135000"/>
+              </a:lnSpc>
+              <a:spcBef>
+                <a:spcPts val="0"/>
+              </a:spcBef>
+              <a:spcAft>
+                <a:spcPts val="0"/>
+              </a:spcAft>
+            </a:pPr>
+            <a:r>
+              <a:rPr sz="1100" b="1">
+                <a:solidFill>
+                  <a:srgbClr val="1E293B"/>
+                </a:solidFill>
+                <a:latin typeface="Calibri"/>
+              </a:rPr>
               <a:t>Three-Generation</a:t>
             </a:r>
           </a:p>
@@ -11100,14 +11360,14 @@
       </p:sp>
       <p:sp>
         <p:nvSpPr>
-          <p:cNvPr id="15" name="TextBox 14"/>
-          <p:cNvSpPr txBox="1"/>
-          <p:nvPr/>
-        </p:nvSpPr>
-        <p:spPr>
-          <a:xfrm>
-            <a:off x="594360" y="3355848"/>
-            <a:ext cx="3657600" cy="320040"/>
+          <p:cNvPr id="21" name="TextBox 20"/>
+          <p:cNvSpPr txBox="1"/>
+          <p:nvPr/>
+        </p:nvSpPr>
+        <p:spPr>
+          <a:xfrm>
+            <a:off x="566928" y="3364992"/>
+            <a:ext cx="3712464" cy="274320"/>
           </a:xfrm>
           <a:prstGeom prst="rect">
             <a:avLst/>
@@ -11130,9 +11390,9 @@
               </a:spcAft>
             </a:pPr>
             <a:r>
-              <a:rPr sz="1400" b="1">
-                <a:solidFill>
-                  <a:srgbClr val="2563EB"/>
+              <a:rPr sz="1300" b="1">
+                <a:solidFill>
+                  <a:srgbClr val="C9A962"/>
                 </a:solidFill>
                 <a:latin typeface="Calibri"/>
               </a:rPr>
@@ -11143,14 +11403,14 @@
       </p:sp>
       <p:sp>
         <p:nvSpPr>
-          <p:cNvPr id="16" name="TextBox 15"/>
-          <p:cNvSpPr txBox="1"/>
-          <p:nvPr/>
-        </p:nvSpPr>
-        <p:spPr>
-          <a:xfrm>
-            <a:off x="594360" y="3749040"/>
-            <a:ext cx="3657600" cy="914400"/>
+          <p:cNvPr id="22" name="TextBox 21"/>
+          <p:cNvSpPr txBox="1"/>
+          <p:nvPr/>
+        </p:nvSpPr>
+        <p:spPr>
+          <a:xfrm>
+            <a:off x="566928" y="3657600"/>
+            <a:ext cx="3712464" cy="411480"/>
           </a:xfrm>
           <a:prstGeom prst="rect">
             <a:avLst/>
@@ -11173,7 +11433,7 @@
               </a:spcAft>
             </a:pPr>
             <a:r>
-              <a:rPr sz="1000" b="0">
+              <a:rPr sz="900" b="0">
                 <a:solidFill>
                   <a:srgbClr val="475569"/>
                 </a:solidFill>
@@ -11186,14 +11446,14 @@
       </p:sp>
       <p:sp>
         <p:nvSpPr>
-          <p:cNvPr id="17" name="Rectangle 16"/>
+          <p:cNvPr id="23" name="Rectangle 22"/>
           <p:cNvSpPr/>
           <p:nvPr/>
         </p:nvSpPr>
         <p:spPr>
           <a:xfrm>
-            <a:off x="4617720" y="2971800"/>
-            <a:ext cx="3931920" cy="1783080"/>
+            <a:off x="4617720" y="3063240"/>
+            <a:ext cx="3931920" cy="1097280"/>
           </a:xfrm>
           <a:prstGeom prst="rect">
             <a:avLst/>
@@ -11231,14 +11491,14 @@
       </p:sp>
       <p:sp>
         <p:nvSpPr>
-          <p:cNvPr id="18" name="TextBox 17"/>
-          <p:cNvSpPr txBox="1"/>
-          <p:nvPr/>
-        </p:nvSpPr>
-        <p:spPr>
-          <a:xfrm>
-            <a:off x="4754880" y="3063240"/>
-            <a:ext cx="3657600" cy="274320"/>
+          <p:cNvPr id="24" name="TextBox 23"/>
+          <p:cNvSpPr txBox="1"/>
+          <p:nvPr/>
+        </p:nvSpPr>
+        <p:spPr>
+          <a:xfrm>
+            <a:off x="4727448" y="3136392"/>
+            <a:ext cx="3712464" cy="228600"/>
           </a:xfrm>
           <a:prstGeom prst="rect">
             <a:avLst/>
@@ -11261,7 +11521,7 @@
               </a:spcAft>
             </a:pPr>
             <a:r>
-              <a:rPr sz="1200" b="1">
+              <a:rPr sz="1100" b="1">
                 <a:solidFill>
                   <a:srgbClr val="1E293B"/>
                 </a:solidFill>
@@ -11274,14 +11534,14 @@
       </p:sp>
       <p:sp>
         <p:nvSpPr>
-          <p:cNvPr id="19" name="TextBox 18"/>
-          <p:cNvSpPr txBox="1"/>
-          <p:nvPr/>
-        </p:nvSpPr>
-        <p:spPr>
-          <a:xfrm>
-            <a:off x="4754880" y="3355848"/>
-            <a:ext cx="3657600" cy="320040"/>
+          <p:cNvPr id="25" name="TextBox 24"/>
+          <p:cNvSpPr txBox="1"/>
+          <p:nvPr/>
+        </p:nvSpPr>
+        <p:spPr>
+          <a:xfrm>
+            <a:off x="4727448" y="3364992"/>
+            <a:ext cx="3712464" cy="274320"/>
           </a:xfrm>
           <a:prstGeom prst="rect">
             <a:avLst/>
@@ -11304,9 +11564,9 @@
               </a:spcAft>
             </a:pPr>
             <a:r>
-              <a:rPr sz="1400" b="1">
-                <a:solidFill>
-                  <a:srgbClr val="2563EB"/>
+              <a:rPr sz="1300" b="1">
+                <a:solidFill>
+                  <a:srgbClr val="C9A962"/>
                 </a:solidFill>
                 <a:latin typeface="Calibri"/>
               </a:rPr>
@@ -11317,14 +11577,14 @@
       </p:sp>
       <p:sp>
         <p:nvSpPr>
-          <p:cNvPr id="20" name="TextBox 19"/>
-          <p:cNvSpPr txBox="1"/>
-          <p:nvPr/>
-        </p:nvSpPr>
-        <p:spPr>
-          <a:xfrm>
-            <a:off x="4754880" y="3749040"/>
-            <a:ext cx="3657600" cy="914400"/>
+          <p:cNvPr id="26" name="TextBox 25"/>
+          <p:cNvSpPr txBox="1"/>
+          <p:nvPr/>
+        </p:nvSpPr>
+        <p:spPr>
+          <a:xfrm>
+            <a:off x="4727448" y="3657600"/>
+            <a:ext cx="3712464" cy="411480"/>
           </a:xfrm>
           <a:prstGeom prst="rect">
             <a:avLst/>
@@ -11347,7 +11607,7 @@
               </a:spcAft>
             </a:pPr>
             <a:r>
-              <a:rPr sz="1000" b="0">
+              <a:rPr sz="900" b="0">
                 <a:solidFill>
                   <a:srgbClr val="475569"/>
                 </a:solidFill>
@@ -11360,7 +11620,7 @@
       </p:sp>
       <p:sp>
         <p:nvSpPr>
-          <p:cNvPr id="21" name="Rectangle 20"/>
+          <p:cNvPr id="27" name="Rectangle 26"/>
           <p:cNvSpPr/>
           <p:nvPr/>
         </p:nvSpPr>
@@ -11403,7 +11663,7 @@
       </p:sp>
       <p:sp>
         <p:nvSpPr>
-          <p:cNvPr id="22" name="TextBox 21"/>
+          <p:cNvPr id="28" name="TextBox 27"/>
           <p:cNvSpPr txBox="1"/>
           <p:nvPr/>
         </p:nvSpPr>
@@ -11446,7 +11706,7 @@
       </p:sp>
       <p:sp>
         <p:nvSpPr>
-          <p:cNvPr id="23" name="TextBox 22"/>
+          <p:cNvPr id="29" name="TextBox 28"/>
           <p:cNvSpPr txBox="1"/>
           <p:nvPr/>
         </p:nvSpPr>
@@ -11489,7 +11749,7 @@
       </p:sp>
       <p:sp>
         <p:nvSpPr>
-          <p:cNvPr id="24" name="TextBox 23"/>
+          <p:cNvPr id="30" name="TextBox 29"/>
           <p:cNvSpPr txBox="1"/>
           <p:nvPr/>
         </p:nvSpPr>

</xml_diff>